<commit_message>
Update 20230330 리눅스 7강 과제 남정현.pptx
</commit_message>
<xml_diff>
--- a/리눅스 과제/과제 미완료/20230330 리눅스 7강 과제 남정현.pptx
+++ b/리눅스 과제/과제 미완료/20230330 리눅스 7강 과제 남정현.pptx
@@ -292,7 +292,7 @@
             <a:fld id="{87DE6118-2437-4B30-8E3C-4D2BE6020583}" type="datetimeFigureOut">
               <a:rPr lang="en-US" dirty="0"/>
               <a:pPr/>
-              <a:t>3/31/2023</a:t>
+              <a:t>4/1/2023</a:t>
             </a:fld>
             <a:endParaRPr lang="en-US" dirty="0"/>
           </a:p>
@@ -618,7 +618,7 @@
           <a:p>
             <a:fld id="{87DE6118-2437-4B30-8E3C-4D2BE6020583}" type="datetimeFigureOut">
               <a:rPr lang="en-US" dirty="0"/>
-              <a:t>3/31/2023</a:t>
+              <a:t>4/1/2023</a:t>
             </a:fld>
             <a:endParaRPr lang="en-US" dirty="0"/>
           </a:p>
@@ -793,7 +793,7 @@
           <a:p>
             <a:fld id="{87DE6118-2437-4B30-8E3C-4D2BE6020583}" type="datetimeFigureOut">
               <a:rPr lang="en-US" dirty="0"/>
-              <a:t>3/31/2023</a:t>
+              <a:t>4/1/2023</a:t>
             </a:fld>
             <a:endParaRPr lang="en-US" dirty="0"/>
           </a:p>
@@ -958,7 +958,7 @@
           <a:p>
             <a:fld id="{87DE6118-2437-4B30-8E3C-4D2BE6020583}" type="datetimeFigureOut">
               <a:rPr lang="en-US" dirty="0"/>
-              <a:t>3/31/2023</a:t>
+              <a:t>4/1/2023</a:t>
             </a:fld>
             <a:endParaRPr lang="en-US" dirty="0"/>
           </a:p>
@@ -1231,7 +1231,7 @@
             <a:fld id="{87DE6118-2437-4B30-8E3C-4D2BE6020583}" type="datetimeFigureOut">
               <a:rPr lang="en-US" dirty="0"/>
               <a:pPr/>
-              <a:t>3/31/2023</a:t>
+              <a:t>4/1/2023</a:t>
             </a:fld>
             <a:endParaRPr lang="en-US" dirty="0"/>
           </a:p>
@@ -1621,7 +1621,7 @@
           <a:p>
             <a:fld id="{87DE6118-2437-4B30-8E3C-4D2BE6020583}" type="datetimeFigureOut">
               <a:rPr lang="en-US" dirty="0"/>
-              <a:t>3/31/2023</a:t>
+              <a:t>4/1/2023</a:t>
             </a:fld>
             <a:endParaRPr lang="en-US" dirty="0"/>
           </a:p>
@@ -2093,7 +2093,7 @@
           <a:p>
             <a:fld id="{87DE6118-2437-4B30-8E3C-4D2BE6020583}" type="datetimeFigureOut">
               <a:rPr lang="en-US" dirty="0"/>
-              <a:t>3/31/2023</a:t>
+              <a:t>4/1/2023</a:t>
             </a:fld>
             <a:endParaRPr lang="en-US" dirty="0"/>
           </a:p>
@@ -2206,7 +2206,7 @@
           <a:p>
             <a:fld id="{87DE6118-2437-4B30-8E3C-4D2BE6020583}" type="datetimeFigureOut">
               <a:rPr lang="en-US" dirty="0"/>
-              <a:t>3/31/2023</a:t>
+              <a:t>4/1/2023</a:t>
             </a:fld>
             <a:endParaRPr lang="en-US" dirty="0"/>
           </a:p>
@@ -2296,7 +2296,7 @@
           <a:p>
             <a:fld id="{87DE6118-2437-4B30-8E3C-4D2BE6020583}" type="datetimeFigureOut">
               <a:rPr lang="en-US" dirty="0"/>
-              <a:t>3/31/2023</a:t>
+              <a:t>4/1/2023</a:t>
             </a:fld>
             <a:endParaRPr lang="en-US" dirty="0"/>
           </a:p>
@@ -2638,7 +2638,7 @@
             <a:fld id="{87DE6118-2437-4B30-8E3C-4D2BE6020583}" type="datetimeFigureOut">
               <a:rPr lang="en-US" dirty="0"/>
               <a:pPr/>
-              <a:t>3/31/2023</a:t>
+              <a:t>4/1/2023</a:t>
             </a:fld>
             <a:endParaRPr lang="en-US" dirty="0"/>
           </a:p>
@@ -3023,7 +3023,7 @@
             <a:fld id="{87DE6118-2437-4B30-8E3C-4D2BE6020583}" type="datetimeFigureOut">
               <a:rPr lang="en-US" dirty="0"/>
               <a:pPr/>
-              <a:t>3/31/2023</a:t>
+              <a:t>4/1/2023</a:t>
             </a:fld>
             <a:endParaRPr lang="en-US" dirty="0"/>
           </a:p>
@@ -3298,7 +3298,7 @@
             <a:fld id="{87DE6118-2437-4B30-8E3C-4D2BE6020583}" type="datetimeFigureOut">
               <a:rPr lang="en-US" dirty="0"/>
               <a:pPr/>
-              <a:t>3/31/2023</a:t>
+              <a:t>4/1/2023</a:t>
             </a:fld>
             <a:endParaRPr lang="en-US" dirty="0"/>
           </a:p>

</xml_diff>